<commit_message>
Modeified 3rd week ppt
</commit_message>
<xml_diff>
--- a/PPT/Team1_Presentation Material_3rd Week.pptx
+++ b/PPT/Team1_Presentation Material_3rd Week.pptx
@@ -6,7 +6,7 @@
     <p:sldMasterId id="2147483671" r:id="rId2"/>
   </p:sldMasterIdLst>
   <p:notesMasterIdLst>
-    <p:notesMasterId r:id="rId23"/>
+    <p:notesMasterId r:id="rId22"/>
   </p:notesMasterIdLst>
   <p:sldIdLst>
     <p:sldId id="256" r:id="rId3"/>
@@ -23,41 +23,40 @@
     <p:sldId id="283" r:id="rId14"/>
     <p:sldId id="280" r:id="rId15"/>
     <p:sldId id="268" r:id="rId16"/>
-    <p:sldId id="269" r:id="rId17"/>
-    <p:sldId id="278" r:id="rId18"/>
-    <p:sldId id="270" r:id="rId19"/>
-    <p:sldId id="271" r:id="rId20"/>
-    <p:sldId id="279" r:id="rId21"/>
-    <p:sldId id="273" r:id="rId22"/>
+    <p:sldId id="278" r:id="rId17"/>
+    <p:sldId id="270" r:id="rId18"/>
+    <p:sldId id="271" r:id="rId19"/>
+    <p:sldId id="279" r:id="rId20"/>
+    <p:sldId id="273" r:id="rId21"/>
   </p:sldIdLst>
   <p:sldSz cx="9144000" cy="6858000" type="screen4x3"/>
   <p:notesSz cx="6858000" cy="9144000"/>
   <p:embeddedFontLst>
     <p:embeddedFont>
-      <p:font typeface="나눔스퀘어" panose="020B0600000101010101" pitchFamily="50" charset="-127"/>
+      <p:font typeface="Aldhabi" panose="01000000000000000000" pitchFamily="2" charset="-78"/>
+      <p:regular r:id="rId23"/>
+    </p:embeddedFont>
+    <p:embeddedFont>
+      <p:font typeface="Maiandra GD" panose="020E0502030308020204" pitchFamily="34" charset="0"/>
       <p:regular r:id="rId24"/>
     </p:embeddedFont>
     <p:embeddedFont>
+      <p:font typeface="나눔스퀘어" panose="020B0600000101010101" pitchFamily="50" charset="-127"/>
+      <p:regular r:id="rId25"/>
+    </p:embeddedFont>
+    <p:embeddedFont>
       <p:font typeface="나눔스퀘어 ExtraBold" panose="020B0600000101010101" pitchFamily="50" charset="-127"/>
-      <p:bold r:id="rId25"/>
+      <p:bold r:id="rId26"/>
     </p:embeddedFont>
     <p:embeddedFont>
       <p:font typeface="맑은 고딕" panose="020B0503020000020004" pitchFamily="50" charset="-127"/>
-      <p:regular r:id="rId26"/>
-      <p:bold r:id="rId27"/>
+      <p:regular r:id="rId27"/>
+      <p:bold r:id="rId28"/>
     </p:embeddedFont>
     <p:embeddedFont>
       <p:font typeface="맑은 고딕" panose="020B0503020000020004" pitchFamily="50" charset="-127"/>
-      <p:regular r:id="rId26"/>
-      <p:bold r:id="rId27"/>
-    </p:embeddedFont>
-    <p:embeddedFont>
-      <p:font typeface="Aldhabi" panose="01000000000000000000" pitchFamily="2" charset="-78"/>
-      <p:regular r:id="rId28"/>
-    </p:embeddedFont>
-    <p:embeddedFont>
-      <p:font typeface="Maiandra GD" panose="020E0502030308020204" pitchFamily="34" charset="0"/>
-      <p:regular r:id="rId29"/>
+      <p:regular r:id="rId27"/>
+      <p:bold r:id="rId28"/>
     </p:embeddedFont>
   </p:embeddedFontLst>
   <p:defaultTextStyle>
@@ -2209,110 +2208,6 @@
               </a:spcAft>
               <a:buNone/>
             </a:pPr>
-            <a:endParaRPr/>
-          </a:p>
-        </p:txBody>
-      </p:sp>
-      <p:sp>
-        <p:nvSpPr>
-          <p:cNvPr id="297" name="Google Shape;297;p5:notes"/>
-          <p:cNvSpPr>
-            <a:spLocks noGrp="1" noRot="1" noChangeAspect="1"/>
-          </p:cNvSpPr>
-          <p:nvPr>
-            <p:ph type="sldImg" idx="2"/>
-          </p:nvPr>
-        </p:nvSpPr>
-        <p:spPr>
-          <a:xfrm>
-            <a:off x="1143000" y="685800"/>
-            <a:ext cx="4572000" cy="3429000"/>
-          </a:xfrm>
-          <a:custGeom>
-            <a:avLst/>
-            <a:gdLst/>
-            <a:ahLst/>
-            <a:cxnLst/>
-            <a:rect l="l" t="t" r="r" b="b"/>
-            <a:pathLst>
-              <a:path w="120000" h="120000" extrusionOk="0">
-                <a:moveTo>
-                  <a:pt x="0" y="0"/>
-                </a:moveTo>
-                <a:lnTo>
-                  <a:pt x="120000" y="0"/>
-                </a:lnTo>
-                <a:lnTo>
-                  <a:pt x="120000" y="120000"/>
-                </a:lnTo>
-                <a:lnTo>
-                  <a:pt x="0" y="120000"/>
-                </a:lnTo>
-                <a:close/>
-              </a:path>
-            </a:pathLst>
-          </a:custGeom>
-        </p:spPr>
-      </p:sp>
-    </p:spTree>
-  </p:cSld>
-  <p:clrMapOvr>
-    <a:masterClrMapping/>
-  </p:clrMapOvr>
-</p:notes>
-</file>
-
-<file path=ppt/notesSlides/notesSlide16.xml><?xml version="1.0" encoding="utf-8"?>
-<p:notes xmlns:a="http://schemas.openxmlformats.org/drawingml/2006/main" xmlns:r="http://schemas.openxmlformats.org/officeDocument/2006/relationships" xmlns:p="http://schemas.openxmlformats.org/presentationml/2006/main" showMasterSp="0" showMasterPhAnim="0">
-  <p:cSld>
-    <p:spTree>
-      <p:nvGrpSpPr>
-        <p:cNvPr id="1" name="Shape 295"/>
-        <p:cNvGrpSpPr/>
-        <p:nvPr/>
-      </p:nvGrpSpPr>
-      <p:grpSpPr>
-        <a:xfrm>
-          <a:off x="0" y="0"/>
-          <a:ext cx="0" cy="0"/>
-          <a:chOff x="0" y="0"/>
-          <a:chExt cx="0" cy="0"/>
-        </a:xfrm>
-      </p:grpSpPr>
-      <p:sp>
-        <p:nvSpPr>
-          <p:cNvPr id="296" name="Google Shape;296;p5:notes"/>
-          <p:cNvSpPr txBox="1">
-            <a:spLocks noGrp="1"/>
-          </p:cNvSpPr>
-          <p:nvPr>
-            <p:ph type="body" idx="1"/>
-          </p:nvPr>
-        </p:nvSpPr>
-        <p:spPr>
-          <a:xfrm>
-            <a:off x="685800" y="4343400"/>
-            <a:ext cx="5486400" cy="4114800"/>
-          </a:xfrm>
-          <a:prstGeom prst="rect">
-            <a:avLst/>
-          </a:prstGeom>
-        </p:spPr>
-        <p:txBody>
-          <a:bodyPr spcFirstLastPara="1" wrap="square" lIns="91425" tIns="91425" rIns="91425" bIns="91425" anchor="t" anchorCtr="0">
-            <a:noAutofit/>
-          </a:bodyPr>
-          <a:lstStyle/>
-          <a:p>
-            <a:pPr marL="0" lvl="0" indent="0" algn="l" rtl="0">
-              <a:spcBef>
-                <a:spcPts val="0"/>
-              </a:spcBef>
-              <a:spcAft>
-                <a:spcPts val="0"/>
-              </a:spcAft>
-              <a:buNone/>
-            </a:pPr>
             <a:endParaRPr dirty="0"/>
           </a:p>
         </p:txBody>
@@ -2371,7 +2266,7 @@
 </p:notes>
 </file>
 
-<file path=ppt/notesSlides/notesSlide17.xml><?xml version="1.0" encoding="utf-8"?>
+<file path=ppt/notesSlides/notesSlide16.xml><?xml version="1.0" encoding="utf-8"?>
 <p:notes xmlns:a="http://schemas.openxmlformats.org/drawingml/2006/main" xmlns:r="http://schemas.openxmlformats.org/officeDocument/2006/relationships" xmlns:p="http://schemas.openxmlformats.org/presentationml/2006/main" showMasterSp="0" showMasterPhAnim="0">
   <p:cSld>
     <p:spTree>
@@ -2429,6 +2324,110 @@
       <p:sp>
         <p:nvSpPr>
           <p:cNvPr id="306" name="Google Shape;306;g4d0eece295_0_32:notes"/>
+          <p:cNvSpPr>
+            <a:spLocks noGrp="1" noRot="1" noChangeAspect="1"/>
+          </p:cNvSpPr>
+          <p:nvPr>
+            <p:ph type="sldImg" idx="2"/>
+          </p:nvPr>
+        </p:nvSpPr>
+        <p:spPr>
+          <a:xfrm>
+            <a:off x="1143000" y="685800"/>
+            <a:ext cx="4572000" cy="3429000"/>
+          </a:xfrm>
+          <a:custGeom>
+            <a:avLst/>
+            <a:gdLst/>
+            <a:ahLst/>
+            <a:cxnLst/>
+            <a:rect l="l" t="t" r="r" b="b"/>
+            <a:pathLst>
+              <a:path w="120000" h="120000" extrusionOk="0">
+                <a:moveTo>
+                  <a:pt x="0" y="0"/>
+                </a:moveTo>
+                <a:lnTo>
+                  <a:pt x="120000" y="0"/>
+                </a:lnTo>
+                <a:lnTo>
+                  <a:pt x="120000" y="120000"/>
+                </a:lnTo>
+                <a:lnTo>
+                  <a:pt x="0" y="120000"/>
+                </a:lnTo>
+                <a:close/>
+              </a:path>
+            </a:pathLst>
+          </a:custGeom>
+        </p:spPr>
+      </p:sp>
+    </p:spTree>
+  </p:cSld>
+  <p:clrMapOvr>
+    <a:masterClrMapping/>
+  </p:clrMapOvr>
+</p:notes>
+</file>
+
+<file path=ppt/notesSlides/notesSlide17.xml><?xml version="1.0" encoding="utf-8"?>
+<p:notes xmlns:a="http://schemas.openxmlformats.org/drawingml/2006/main" xmlns:r="http://schemas.openxmlformats.org/officeDocument/2006/relationships" xmlns:p="http://schemas.openxmlformats.org/presentationml/2006/main" showMasterSp="0" showMasterPhAnim="0">
+  <p:cSld>
+    <p:spTree>
+      <p:nvGrpSpPr>
+        <p:cNvPr id="1" name="Shape 313"/>
+        <p:cNvGrpSpPr/>
+        <p:nvPr/>
+      </p:nvGrpSpPr>
+      <p:grpSpPr>
+        <a:xfrm>
+          <a:off x="0" y="0"/>
+          <a:ext cx="0" cy="0"/>
+          <a:chOff x="0" y="0"/>
+          <a:chExt cx="0" cy="0"/>
+        </a:xfrm>
+      </p:grpSpPr>
+      <p:sp>
+        <p:nvSpPr>
+          <p:cNvPr id="314" name="Google Shape;314;p6:notes"/>
+          <p:cNvSpPr txBox="1">
+            <a:spLocks noGrp="1"/>
+          </p:cNvSpPr>
+          <p:nvPr>
+            <p:ph type="body" idx="1"/>
+          </p:nvPr>
+        </p:nvSpPr>
+        <p:spPr>
+          <a:xfrm>
+            <a:off x="685800" y="4343400"/>
+            <a:ext cx="5486400" cy="4114800"/>
+          </a:xfrm>
+          <a:prstGeom prst="rect">
+            <a:avLst/>
+          </a:prstGeom>
+        </p:spPr>
+        <p:txBody>
+          <a:bodyPr spcFirstLastPara="1" wrap="square" lIns="91425" tIns="91425" rIns="91425" bIns="91425" anchor="t" anchorCtr="0">
+            <a:noAutofit/>
+          </a:bodyPr>
+          <a:lstStyle/>
+          <a:p>
+            <a:pPr marL="0" lvl="0" indent="0" algn="l" rtl="0">
+              <a:spcBef>
+                <a:spcPts val="0"/>
+              </a:spcBef>
+              <a:spcAft>
+                <a:spcPts val="0"/>
+              </a:spcAft>
+              <a:buNone/>
+            </a:pPr>
+            <a:endParaRPr/>
+          </a:p>
+        </p:txBody>
+      </p:sp>
+      <p:sp>
+        <p:nvSpPr>
+          <p:cNvPr id="315" name="Google Shape;315;p6:notes"/>
           <p:cNvSpPr>
             <a:spLocks noGrp="1" noRot="1" noChangeAspect="1"/>
           </p:cNvSpPr>
@@ -2572,6 +2571,11 @@
         </p:spPr>
       </p:sp>
     </p:spTree>
+    <p:extLst>
+      <p:ext uri="{BB962C8B-B14F-4D97-AF65-F5344CB8AC3E}">
+        <p14:creationId xmlns:p14="http://schemas.microsoft.com/office/powerpoint/2010/main" val="751480244"/>
+      </p:ext>
+    </p:extLst>
   </p:cSld>
   <p:clrMapOvr>
     <a:masterClrMapping/>
@@ -2584,7 +2588,7 @@
   <p:cSld>
     <p:spTree>
       <p:nvGrpSpPr>
-        <p:cNvPr id="1" name="Shape 313"/>
+        <p:cNvPr id="1" name="Shape 339"/>
         <p:cNvGrpSpPr/>
         <p:nvPr/>
       </p:nvGrpSpPr>
@@ -2598,7 +2602,7 @@
       </p:grpSpPr>
       <p:sp>
         <p:nvSpPr>
-          <p:cNvPr id="314" name="Google Shape;314;p6:notes"/>
+          <p:cNvPr id="340" name="Google Shape;340;p8:notes"/>
           <p:cNvSpPr txBox="1">
             <a:spLocks noGrp="1"/>
           </p:cNvSpPr>
@@ -2630,13 +2634,13 @@
               </a:spcAft>
               <a:buNone/>
             </a:pPr>
-            <a:endParaRPr/>
+            <a:endParaRPr dirty="0"/>
           </a:p>
         </p:txBody>
       </p:sp>
       <p:sp>
         <p:nvSpPr>
-          <p:cNvPr id="315" name="Google Shape;315;p6:notes"/>
+          <p:cNvPr id="341" name="Google Shape;341;p8:notes"/>
           <p:cNvSpPr>
             <a:spLocks noGrp="1" noRot="1" noChangeAspect="1"/>
           </p:cNvSpPr>
@@ -2676,11 +2680,6 @@
         </p:spPr>
       </p:sp>
     </p:spTree>
-    <p:extLst>
-      <p:ext uri="{BB962C8B-B14F-4D97-AF65-F5344CB8AC3E}">
-        <p14:creationId xmlns:p14="http://schemas.microsoft.com/office/powerpoint/2010/main" val="751480244"/>
-      </p:ext>
-    </p:extLst>
   </p:cSld>
   <p:clrMapOvr>
     <a:masterClrMapping/>
@@ -2790,110 +2789,6 @@
         <p14:creationId xmlns:p14="http://schemas.microsoft.com/office/powerpoint/2010/main" val="1111333976"/>
       </p:ext>
     </p:extLst>
-  </p:cSld>
-  <p:clrMapOvr>
-    <a:masterClrMapping/>
-  </p:clrMapOvr>
-</p:notes>
-</file>
-
-<file path=ppt/notesSlides/notesSlide20.xml><?xml version="1.0" encoding="utf-8"?>
-<p:notes xmlns:a="http://schemas.openxmlformats.org/drawingml/2006/main" xmlns:r="http://schemas.openxmlformats.org/officeDocument/2006/relationships" xmlns:p="http://schemas.openxmlformats.org/presentationml/2006/main" showMasterSp="0" showMasterPhAnim="0">
-  <p:cSld>
-    <p:spTree>
-      <p:nvGrpSpPr>
-        <p:cNvPr id="1" name="Shape 339"/>
-        <p:cNvGrpSpPr/>
-        <p:nvPr/>
-      </p:nvGrpSpPr>
-      <p:grpSpPr>
-        <a:xfrm>
-          <a:off x="0" y="0"/>
-          <a:ext cx="0" cy="0"/>
-          <a:chOff x="0" y="0"/>
-          <a:chExt cx="0" cy="0"/>
-        </a:xfrm>
-      </p:grpSpPr>
-      <p:sp>
-        <p:nvSpPr>
-          <p:cNvPr id="340" name="Google Shape;340;p8:notes"/>
-          <p:cNvSpPr txBox="1">
-            <a:spLocks noGrp="1"/>
-          </p:cNvSpPr>
-          <p:nvPr>
-            <p:ph type="body" idx="1"/>
-          </p:nvPr>
-        </p:nvSpPr>
-        <p:spPr>
-          <a:xfrm>
-            <a:off x="685800" y="4343400"/>
-            <a:ext cx="5486400" cy="4114800"/>
-          </a:xfrm>
-          <a:prstGeom prst="rect">
-            <a:avLst/>
-          </a:prstGeom>
-        </p:spPr>
-        <p:txBody>
-          <a:bodyPr spcFirstLastPara="1" wrap="square" lIns="91425" tIns="91425" rIns="91425" bIns="91425" anchor="t" anchorCtr="0">
-            <a:noAutofit/>
-          </a:bodyPr>
-          <a:lstStyle/>
-          <a:p>
-            <a:pPr marL="0" lvl="0" indent="0" algn="l" rtl="0">
-              <a:spcBef>
-                <a:spcPts val="0"/>
-              </a:spcBef>
-              <a:spcAft>
-                <a:spcPts val="0"/>
-              </a:spcAft>
-              <a:buNone/>
-            </a:pPr>
-            <a:endParaRPr dirty="0"/>
-          </a:p>
-        </p:txBody>
-      </p:sp>
-      <p:sp>
-        <p:nvSpPr>
-          <p:cNvPr id="341" name="Google Shape;341;p8:notes"/>
-          <p:cNvSpPr>
-            <a:spLocks noGrp="1" noRot="1" noChangeAspect="1"/>
-          </p:cNvSpPr>
-          <p:nvPr>
-            <p:ph type="sldImg" idx="2"/>
-          </p:nvPr>
-        </p:nvSpPr>
-        <p:spPr>
-          <a:xfrm>
-            <a:off x="1143000" y="685800"/>
-            <a:ext cx="4572000" cy="3429000"/>
-          </a:xfrm>
-          <a:custGeom>
-            <a:avLst/>
-            <a:gdLst/>
-            <a:ahLst/>
-            <a:cxnLst/>
-            <a:rect l="l" t="t" r="r" b="b"/>
-            <a:pathLst>
-              <a:path w="120000" h="120000" extrusionOk="0">
-                <a:moveTo>
-                  <a:pt x="0" y="0"/>
-                </a:moveTo>
-                <a:lnTo>
-                  <a:pt x="120000" y="0"/>
-                </a:lnTo>
-                <a:lnTo>
-                  <a:pt x="120000" y="120000"/>
-                </a:lnTo>
-                <a:lnTo>
-                  <a:pt x="0" y="120000"/>
-                </a:lnTo>
-                <a:close/>
-              </a:path>
-            </a:pathLst>
-          </a:custGeom>
-        </p:spPr>
-      </p:sp>
-    </p:spTree>
   </p:cSld>
   <p:clrMapOvr>
     <a:masterClrMapping/>
@@ -29707,418 +29602,6 @@
           </a:p>
         </p:txBody>
       </p:sp>
-      <p:sp>
-        <p:nvSpPr>
-          <p:cNvPr id="303" name="Google Shape;303;p38"/>
-          <p:cNvSpPr txBox="1"/>
-          <p:nvPr/>
-        </p:nvSpPr>
-        <p:spPr>
-          <a:xfrm>
-            <a:off x="638592" y="1261800"/>
-            <a:ext cx="3634800" cy="4572600"/>
-          </a:xfrm>
-          <a:prstGeom prst="rect">
-            <a:avLst/>
-          </a:prstGeom>
-          <a:noFill/>
-          <a:ln>
-            <a:noFill/>
-          </a:ln>
-        </p:spPr>
-        <p:txBody>
-          <a:bodyPr spcFirstLastPara="1" wrap="square" lIns="91425" tIns="45700" rIns="91425" bIns="45700" anchor="t" anchorCtr="0">
-            <a:noAutofit/>
-          </a:bodyPr>
-          <a:lstStyle/>
-          <a:p>
-            <a:pPr marL="457200" marR="0" lvl="0" indent="-355600" algn="l" rtl="0">
-              <a:lnSpc>
-                <a:spcPct val="250000"/>
-              </a:lnSpc>
-              <a:spcBef>
-                <a:spcPts val="0"/>
-              </a:spcBef>
-              <a:spcAft>
-                <a:spcPts val="0"/>
-              </a:spcAft>
-              <a:buClr>
-                <a:schemeClr val="dk1"/>
-              </a:buClr>
-              <a:buSzPts val="2000"/>
-              <a:buFont typeface="Arial" panose="020B0604020202020204" pitchFamily="34" charset="0"/>
-              <a:buChar char="•"/>
-            </a:pPr>
-            <a:r>
-              <a:rPr lang="en-US" sz="1800" dirty="0">
-                <a:solidFill>
-                  <a:schemeClr val="dk1"/>
-                </a:solidFill>
-                <a:latin typeface="나눔스퀘어" panose="020B0600000101010101" pitchFamily="50" charset="-127"/>
-                <a:ea typeface="나눔스퀘어" panose="020B0600000101010101" pitchFamily="50" charset="-127"/>
-                <a:cs typeface="Malgun Gothic"/>
-                <a:sym typeface="Malgun Gothic"/>
-              </a:rPr>
-              <a:t>Java SDK 11.0.2</a:t>
-            </a:r>
-          </a:p>
-          <a:p>
-            <a:pPr marL="457200" marR="0" lvl="0" indent="-355600" algn="l" rtl="0">
-              <a:lnSpc>
-                <a:spcPct val="250000"/>
-              </a:lnSpc>
-              <a:spcBef>
-                <a:spcPts val="0"/>
-              </a:spcBef>
-              <a:spcAft>
-                <a:spcPts val="0"/>
-              </a:spcAft>
-              <a:buClr>
-                <a:schemeClr val="dk1"/>
-              </a:buClr>
-              <a:buSzPts val="2000"/>
-              <a:buFont typeface="Arial" panose="020B0604020202020204" pitchFamily="34" charset="0"/>
-              <a:buChar char="•"/>
-            </a:pPr>
-            <a:r>
-              <a:rPr lang="en-US" sz="1800" dirty="0">
-                <a:solidFill>
-                  <a:schemeClr val="dk1"/>
-                </a:solidFill>
-                <a:latin typeface="나눔스퀘어" panose="020B0600000101010101" pitchFamily="50" charset="-127"/>
-                <a:ea typeface="나눔스퀘어" panose="020B0600000101010101" pitchFamily="50" charset="-127"/>
-                <a:sym typeface="Malgun Gothic"/>
-              </a:rPr>
-              <a:t>Android SDK 26.0</a:t>
-            </a:r>
-          </a:p>
-          <a:p>
-            <a:pPr marL="457200" marR="0" lvl="0" indent="-355600" algn="l" rtl="0">
-              <a:lnSpc>
-                <a:spcPct val="250000"/>
-              </a:lnSpc>
-              <a:spcBef>
-                <a:spcPts val="0"/>
-              </a:spcBef>
-              <a:spcAft>
-                <a:spcPts val="0"/>
-              </a:spcAft>
-              <a:buClr>
-                <a:schemeClr val="dk1"/>
-              </a:buClr>
-              <a:buSzPts val="2000"/>
-              <a:buFont typeface="Arial" panose="020B0604020202020204" pitchFamily="34" charset="0"/>
-              <a:buChar char="•"/>
-            </a:pPr>
-            <a:r>
-              <a:rPr lang="en-US" sz="1800" dirty="0">
-                <a:solidFill>
-                  <a:schemeClr val="dk1"/>
-                </a:solidFill>
-                <a:latin typeface="나눔스퀘어" panose="020B0600000101010101" pitchFamily="50" charset="-127"/>
-                <a:ea typeface="나눔스퀘어" panose="020B0600000101010101" pitchFamily="50" charset="-127"/>
-                <a:sym typeface="Malgun Gothic"/>
-              </a:rPr>
-              <a:t>Android Studio 3.3.2</a:t>
-            </a:r>
-          </a:p>
-          <a:p>
-            <a:pPr marL="457200" marR="0" lvl="0" indent="-355600" algn="l" rtl="0">
-              <a:lnSpc>
-                <a:spcPct val="250000"/>
-              </a:lnSpc>
-              <a:spcBef>
-                <a:spcPts val="0"/>
-              </a:spcBef>
-              <a:spcAft>
-                <a:spcPts val="0"/>
-              </a:spcAft>
-              <a:buClr>
-                <a:schemeClr val="dk1"/>
-              </a:buClr>
-              <a:buSzPts val="2000"/>
-              <a:buFont typeface="Arial" panose="020B0604020202020204" pitchFamily="34" charset="0"/>
-              <a:buChar char="•"/>
-            </a:pPr>
-            <a:r>
-              <a:rPr lang="en-US" sz="1800" dirty="0">
-                <a:solidFill>
-                  <a:schemeClr val="dk1"/>
-                </a:solidFill>
-                <a:latin typeface="나눔스퀘어" panose="020B0600000101010101" pitchFamily="50" charset="-127"/>
-                <a:ea typeface="나눔스퀘어" panose="020B0600000101010101" pitchFamily="50" charset="-127"/>
-                <a:sym typeface="Malgun Gothic"/>
-              </a:rPr>
-              <a:t>PHP</a:t>
-            </a:r>
-          </a:p>
-          <a:p>
-            <a:pPr marL="457200" marR="0" lvl="0" indent="-355600" algn="l" rtl="0">
-              <a:lnSpc>
-                <a:spcPct val="250000"/>
-              </a:lnSpc>
-              <a:spcBef>
-                <a:spcPts val="0"/>
-              </a:spcBef>
-              <a:spcAft>
-                <a:spcPts val="0"/>
-              </a:spcAft>
-              <a:buClr>
-                <a:schemeClr val="dk1"/>
-              </a:buClr>
-              <a:buSzPts val="2000"/>
-              <a:buFont typeface="Arial" panose="020B0604020202020204" pitchFamily="34" charset="0"/>
-              <a:buChar char="•"/>
-            </a:pPr>
-            <a:r>
-              <a:rPr lang="en-US" sz="1800" dirty="0">
-                <a:solidFill>
-                  <a:schemeClr val="dk1"/>
-                </a:solidFill>
-                <a:latin typeface="나눔스퀘어" panose="020B0600000101010101" pitchFamily="50" charset="-127"/>
-                <a:ea typeface="나눔스퀘어" panose="020B0600000101010101" pitchFamily="50" charset="-127"/>
-                <a:cs typeface="Malgun Gothic"/>
-                <a:sym typeface="Malgun Gothic"/>
-              </a:rPr>
-              <a:t>MySQL</a:t>
-            </a:r>
-          </a:p>
-          <a:p>
-            <a:pPr marL="457200" indent="-355600">
-              <a:lnSpc>
-                <a:spcPct val="250000"/>
-              </a:lnSpc>
-              <a:buClr>
-                <a:schemeClr val="dk1"/>
-              </a:buClr>
-              <a:buSzPts val="2000"/>
-              <a:buFont typeface="Arial" panose="020B0604020202020204" pitchFamily="34" charset="0"/>
-              <a:buChar char="•"/>
-            </a:pPr>
-            <a:r>
-              <a:rPr lang="en-US" altLang="ko-KR" sz="1800" dirty="0">
-                <a:solidFill>
-                  <a:schemeClr val="dk1"/>
-                </a:solidFill>
-                <a:latin typeface="나눔스퀘어" panose="020B0600000101010101" pitchFamily="50" charset="-127"/>
-                <a:ea typeface="나눔스퀘어" panose="020B0600000101010101" pitchFamily="50" charset="-127"/>
-                <a:sym typeface="Malgun Gothic"/>
-              </a:rPr>
-              <a:t>Raspberry Pi</a:t>
-            </a:r>
-            <a:endParaRPr lang="en-US" altLang="ko-KR" sz="1800" dirty="0">
-              <a:latin typeface="나눔스퀘어" panose="020B0600000101010101" pitchFamily="50" charset="-127"/>
-              <a:ea typeface="나눔스퀘어" panose="020B0600000101010101" pitchFamily="50" charset="-127"/>
-            </a:endParaRPr>
-          </a:p>
-        </p:txBody>
-      </p:sp>
-    </p:spTree>
-  </p:cSld>
-  <p:clrMapOvr>
-    <a:masterClrMapping/>
-  </p:clrMapOvr>
-</p:sld>
-</file>
-
-<file path=ppt/slides/slide16.xml><?xml version="1.0" encoding="utf-8"?>
-<p:sld xmlns:a="http://schemas.openxmlformats.org/drawingml/2006/main" xmlns:r="http://schemas.openxmlformats.org/officeDocument/2006/relationships" xmlns:p="http://schemas.openxmlformats.org/presentationml/2006/main">
-  <p:cSld>
-    <p:spTree>
-      <p:nvGrpSpPr>
-        <p:cNvPr id="1" name="Shape 298"/>
-        <p:cNvGrpSpPr/>
-        <p:nvPr/>
-      </p:nvGrpSpPr>
-      <p:grpSpPr>
-        <a:xfrm>
-          <a:off x="0" y="0"/>
-          <a:ext cx="0" cy="0"/>
-          <a:chOff x="0" y="0"/>
-          <a:chExt cx="0" cy="0"/>
-        </a:xfrm>
-      </p:grpSpPr>
-      <p:pic>
-        <p:nvPicPr>
-          <p:cNvPr id="299" name="Google Shape;299;p38" descr="14902-NQ2QMR.jpg"/>
-          <p:cNvPicPr preferRelativeResize="0"/>
-          <p:nvPr/>
-        </p:nvPicPr>
-        <p:blipFill rotWithShape="1">
-          <a:blip r:embed="rId3">
-            <a:alphaModFix/>
-          </a:blip>
-          <a:srcRect l="3150" t="52499" r="92970" b="43301"/>
-          <a:stretch/>
-        </p:blipFill>
-        <p:spPr>
-          <a:xfrm>
-            <a:off x="0" y="0"/>
-            <a:ext cx="9143999" cy="404664"/>
-          </a:xfrm>
-          <a:prstGeom prst="rect">
-            <a:avLst/>
-          </a:prstGeom>
-          <a:noFill/>
-          <a:ln>
-            <a:noFill/>
-          </a:ln>
-        </p:spPr>
-      </p:pic>
-      <p:pic>
-        <p:nvPicPr>
-          <p:cNvPr id="300" name="Google Shape;300;p38" descr="14902-NQ2QMR.jpg"/>
-          <p:cNvPicPr preferRelativeResize="0"/>
-          <p:nvPr/>
-        </p:nvPicPr>
-        <p:blipFill rotWithShape="1">
-          <a:blip r:embed="rId3">
-            <a:alphaModFix/>
-            <a:duotone>
-              <a:prstClr val="black"/>
-              <a:schemeClr val="accent3">
-                <a:lumMod val="60000"/>
-                <a:lumOff val="40000"/>
-                <a:tint val="45000"/>
-                <a:satMod val="400000"/>
-              </a:schemeClr>
-            </a:duotone>
-          </a:blip>
-          <a:srcRect l="3150" t="52499" r="92970" b="43301"/>
-          <a:stretch/>
-        </p:blipFill>
-        <p:spPr>
-          <a:xfrm>
-            <a:off x="0" y="6480720"/>
-            <a:ext cx="9143999" cy="404664"/>
-          </a:xfrm>
-          <a:prstGeom prst="rect">
-            <a:avLst/>
-          </a:prstGeom>
-          <a:noFill/>
-          <a:ln>
-            <a:noFill/>
-          </a:ln>
-        </p:spPr>
-      </p:pic>
-      <p:pic>
-        <p:nvPicPr>
-          <p:cNvPr id="301" name="Google Shape;301;p38" descr="14902-NQ2QMR.jpg"/>
-          <p:cNvPicPr preferRelativeResize="0"/>
-          <p:nvPr/>
-        </p:nvPicPr>
-        <p:blipFill rotWithShape="1">
-          <a:blip r:embed="rId3">
-            <a:alphaModFix/>
-            <a:duotone>
-              <a:prstClr val="black"/>
-              <a:schemeClr val="accent3">
-                <a:lumMod val="60000"/>
-                <a:lumOff val="40000"/>
-                <a:tint val="45000"/>
-                <a:satMod val="400000"/>
-              </a:schemeClr>
-            </a:duotone>
-          </a:blip>
-          <a:srcRect l="3150" t="52499" r="92970" b="43301"/>
-          <a:stretch/>
-        </p:blipFill>
-        <p:spPr>
-          <a:xfrm>
-            <a:off x="-1" y="-25404"/>
-            <a:ext cx="9143999" cy="980728"/>
-          </a:xfrm>
-          <a:prstGeom prst="rect">
-            <a:avLst/>
-          </a:prstGeom>
-          <a:noFill/>
-          <a:ln>
-            <a:noFill/>
-          </a:ln>
-        </p:spPr>
-      </p:pic>
-      <p:sp>
-        <p:nvSpPr>
-          <p:cNvPr id="302" name="Google Shape;302;p38"/>
-          <p:cNvSpPr txBox="1"/>
-          <p:nvPr/>
-        </p:nvSpPr>
-        <p:spPr>
-          <a:xfrm>
-            <a:off x="-8" y="0"/>
-            <a:ext cx="8162231" cy="1261800"/>
-          </a:xfrm>
-          <a:prstGeom prst="rect">
-            <a:avLst/>
-          </a:prstGeom>
-          <a:noFill/>
-          <a:ln>
-            <a:noFill/>
-          </a:ln>
-        </p:spPr>
-        <p:txBody>
-          <a:bodyPr spcFirstLastPara="1" wrap="square" lIns="91425" tIns="45700" rIns="91425" bIns="45700" anchor="ctr" anchorCtr="0">
-            <a:noAutofit/>
-          </a:bodyPr>
-          <a:lstStyle/>
-          <a:p>
-            <a:pPr marL="0" marR="0" lvl="0" indent="0" algn="l" rtl="0">
-              <a:spcBef>
-                <a:spcPts val="0"/>
-              </a:spcBef>
-              <a:spcAft>
-                <a:spcPts val="0"/>
-              </a:spcAft>
-              <a:buNone/>
-            </a:pPr>
-            <a:r>
-              <a:rPr lang="en-US" sz="3000" b="1" dirty="0">
-                <a:solidFill>
-                  <a:srgbClr val="274E13"/>
-                </a:solidFill>
-                <a:latin typeface="나눔스퀘어 ExtraBold" panose="020B0600000101010101" pitchFamily="50" charset="-127"/>
-                <a:ea typeface="나눔스퀘어 ExtraBold" panose="020B0600000101010101" pitchFamily="50" charset="-127"/>
-                <a:cs typeface="Malgun Gothic"/>
-                <a:sym typeface="Malgun Gothic"/>
-              </a:rPr>
-              <a:t>  5. Development</a:t>
-            </a:r>
-            <a:r>
-              <a:rPr lang="en-US" sz="3000" dirty="0">
-                <a:solidFill>
-                  <a:srgbClr val="274E13"/>
-                </a:solidFill>
-                <a:latin typeface="나눔스퀘어 ExtraBold" panose="020B0600000101010101" pitchFamily="50" charset="-127"/>
-                <a:ea typeface="나눔스퀘어 ExtraBold" panose="020B0600000101010101" pitchFamily="50" charset="-127"/>
-                <a:cs typeface="Malgun Gothic"/>
-                <a:sym typeface="Malgun Gothic"/>
-              </a:rPr>
-              <a:t> </a:t>
-            </a:r>
-            <a:r>
-              <a:rPr lang="en-US" sz="3000" b="1" dirty="0">
-                <a:solidFill>
-                  <a:srgbClr val="274E13"/>
-                </a:solidFill>
-                <a:latin typeface="나눔스퀘어 ExtraBold" panose="020B0600000101010101" pitchFamily="50" charset="-127"/>
-                <a:ea typeface="나눔스퀘어 ExtraBold" panose="020B0600000101010101" pitchFamily="50" charset="-127"/>
-                <a:cs typeface="Malgun Gothic"/>
-                <a:sym typeface="Malgun Gothic"/>
-              </a:rPr>
-              <a:t>Environment</a:t>
-            </a:r>
-            <a:endParaRPr sz="3000" dirty="0">
-              <a:solidFill>
-                <a:srgbClr val="274E13"/>
-              </a:solidFill>
-              <a:latin typeface="나눔스퀘어 ExtraBold" panose="020B0600000101010101" pitchFamily="50" charset="-127"/>
-              <a:ea typeface="나눔스퀘어 ExtraBold" panose="020B0600000101010101" pitchFamily="50" charset="-127"/>
-              <a:cs typeface="Malgun Gothic"/>
-              <a:sym typeface="Malgun Gothic"/>
-            </a:endParaRPr>
-          </a:p>
-        </p:txBody>
-      </p:sp>
       <p:grpSp>
         <p:nvGrpSpPr>
           <p:cNvPr id="8" name="그룹 7">
@@ -30567,7 +30050,7 @@
 </p:sld>
 </file>
 
-<file path=ppt/slides/slide17.xml><?xml version="1.0" encoding="utf-8"?>
+<file path=ppt/slides/slide16.xml><?xml version="1.0" encoding="utf-8"?>
 <p:sld xmlns:a="http://schemas.openxmlformats.org/drawingml/2006/main" xmlns:r="http://schemas.openxmlformats.org/officeDocument/2006/relationships" xmlns:p="http://schemas.openxmlformats.org/presentationml/2006/main">
   <p:cSld>
     <p:spTree>
@@ -30795,7 +30278,7 @@
 </p:sld>
 </file>
 
-<file path=ppt/slides/slide18.xml><?xml version="1.0" encoding="utf-8"?>
+<file path=ppt/slides/slide17.xml><?xml version="1.0" encoding="utf-8"?>
 <p:sld xmlns:a="http://schemas.openxmlformats.org/drawingml/2006/main" xmlns:r="http://schemas.openxmlformats.org/officeDocument/2006/relationships" xmlns:p="http://schemas.openxmlformats.org/presentationml/2006/main">
   <p:cSld>
     <p:spTree>
@@ -31493,7 +30976,7 @@
 </p:sld>
 </file>
 
-<file path=ppt/slides/slide19.xml><?xml version="1.0" encoding="utf-8"?>
+<file path=ppt/slides/slide18.xml><?xml version="1.0" encoding="utf-8"?>
 <p:sld xmlns:a="http://schemas.openxmlformats.org/drawingml/2006/main" xmlns:r="http://schemas.openxmlformats.org/officeDocument/2006/relationships" xmlns:p="http://schemas.openxmlformats.org/presentationml/2006/main">
   <p:cSld>
     <p:spTree>
@@ -31710,6 +31193,185 @@
 </p:sld>
 </file>
 
+<file path=ppt/slides/slide19.xml><?xml version="1.0" encoding="utf-8"?>
+<p:sld xmlns:a="http://schemas.openxmlformats.org/drawingml/2006/main" xmlns:r="http://schemas.openxmlformats.org/officeDocument/2006/relationships" xmlns:p="http://schemas.openxmlformats.org/presentationml/2006/main">
+  <p:cSld>
+    <p:spTree>
+      <p:nvGrpSpPr>
+        <p:cNvPr id="1" name="Shape 342"/>
+        <p:cNvGrpSpPr/>
+        <p:nvPr/>
+      </p:nvGrpSpPr>
+      <p:grpSpPr>
+        <a:xfrm>
+          <a:off x="0" y="0"/>
+          <a:ext cx="0" cy="0"/>
+          <a:chOff x="0" y="0"/>
+          <a:chExt cx="0" cy="0"/>
+        </a:xfrm>
+      </p:grpSpPr>
+      <p:pic>
+        <p:nvPicPr>
+          <p:cNvPr id="343" name="Google Shape;343;p42" descr="14902-NQ2QMR.jpg"/>
+          <p:cNvPicPr preferRelativeResize="0"/>
+          <p:nvPr/>
+        </p:nvPicPr>
+        <p:blipFill rotWithShape="1">
+          <a:blip r:embed="rId3">
+            <a:alphaModFix/>
+            <a:duotone>
+              <a:prstClr val="black"/>
+              <a:schemeClr val="accent3">
+                <a:lumMod val="60000"/>
+                <a:lumOff val="40000"/>
+                <a:tint val="45000"/>
+                <a:satMod val="400000"/>
+              </a:schemeClr>
+            </a:duotone>
+          </a:blip>
+          <a:srcRect l="3150" t="52499" r="92970" b="43301"/>
+          <a:stretch/>
+        </p:blipFill>
+        <p:spPr>
+          <a:xfrm>
+            <a:off x="0" y="0"/>
+            <a:ext cx="9144000" cy="6858000"/>
+          </a:xfrm>
+          <a:prstGeom prst="rect">
+            <a:avLst/>
+          </a:prstGeom>
+          <a:noFill/>
+          <a:ln>
+            <a:noFill/>
+          </a:ln>
+        </p:spPr>
+      </p:pic>
+      <p:sp>
+        <p:nvSpPr>
+          <p:cNvPr id="344" name="Google Shape;344;p42"/>
+          <p:cNvSpPr txBox="1">
+            <a:spLocks noGrp="1"/>
+          </p:cNvSpPr>
+          <p:nvPr>
+            <p:ph type="subTitle" idx="1"/>
+          </p:nvPr>
+        </p:nvSpPr>
+        <p:spPr>
+          <a:xfrm>
+            <a:off x="2987824" y="3140968"/>
+            <a:ext cx="5832648" cy="1080120"/>
+          </a:xfrm>
+          <a:prstGeom prst="rect">
+            <a:avLst/>
+          </a:prstGeom>
+          <a:noFill/>
+          <a:ln>
+            <a:noFill/>
+          </a:ln>
+        </p:spPr>
+        <p:txBody>
+          <a:bodyPr spcFirstLastPara="1" wrap="square" lIns="91425" tIns="45700" rIns="91425" bIns="45700" anchor="t" anchorCtr="0">
+            <a:noAutofit/>
+          </a:bodyPr>
+          <a:lstStyle/>
+          <a:p>
+            <a:pPr marL="0" lvl="0" indent="0" algn="ctr" rtl="0">
+              <a:spcBef>
+                <a:spcPts val="880"/>
+              </a:spcBef>
+              <a:spcAft>
+                <a:spcPts val="0"/>
+              </a:spcAft>
+              <a:buClr>
+                <a:srgbClr val="888888"/>
+              </a:buClr>
+              <a:buSzPts val="4400"/>
+              <a:buNone/>
+            </a:pPr>
+            <a:r>
+              <a:rPr lang="en-US" sz="4400" b="1" dirty="0">
+                <a:solidFill>
+                  <a:schemeClr val="lt1"/>
+                </a:solidFill>
+                <a:latin typeface="Malgun Gothic"/>
+                <a:ea typeface="Malgun Gothic"/>
+                <a:cs typeface="Malgun Gothic"/>
+                <a:sym typeface="Malgun Gothic"/>
+              </a:rPr>
+              <a:t>Q&amp;A</a:t>
+            </a:r>
+            <a:endParaRPr sz="4400" b="1" dirty="0">
+              <a:solidFill>
+                <a:schemeClr val="lt1"/>
+              </a:solidFill>
+              <a:latin typeface="Malgun Gothic"/>
+              <a:ea typeface="Malgun Gothic"/>
+              <a:cs typeface="Malgun Gothic"/>
+              <a:sym typeface="Malgun Gothic"/>
+            </a:endParaRPr>
+          </a:p>
+        </p:txBody>
+      </p:sp>
+      <p:cxnSp>
+        <p:nvCxnSpPr>
+          <p:cNvPr id="345" name="Google Shape;345;p42"/>
+          <p:cNvCxnSpPr/>
+          <p:nvPr/>
+        </p:nvCxnSpPr>
+        <p:spPr>
+          <a:xfrm>
+            <a:off x="0" y="980728"/>
+            <a:ext cx="9144000" cy="0"/>
+          </a:xfrm>
+          <a:prstGeom prst="straightConnector1">
+            <a:avLst/>
+          </a:prstGeom>
+          <a:noFill/>
+          <a:ln w="38100" cap="flat" cmpd="sng">
+            <a:solidFill>
+              <a:srgbClr val="F8F9FA"/>
+            </a:solidFill>
+            <a:prstDash val="dash"/>
+            <a:round/>
+            <a:headEnd type="none" w="sm" len="sm"/>
+            <a:tailEnd type="none" w="sm" len="sm"/>
+          </a:ln>
+        </p:spPr>
+      </p:cxnSp>
+      <p:cxnSp>
+        <p:nvCxnSpPr>
+          <p:cNvPr id="346" name="Google Shape;346;p42"/>
+          <p:cNvCxnSpPr/>
+          <p:nvPr/>
+        </p:nvCxnSpPr>
+        <p:spPr>
+          <a:xfrm>
+            <a:off x="0" y="5877272"/>
+            <a:ext cx="9144000" cy="0"/>
+          </a:xfrm>
+          <a:prstGeom prst="straightConnector1">
+            <a:avLst/>
+          </a:prstGeom>
+          <a:noFill/>
+          <a:ln w="38100" cap="flat" cmpd="sng">
+            <a:solidFill>
+              <a:srgbClr val="F8F9FA"/>
+            </a:solidFill>
+            <a:prstDash val="dash"/>
+            <a:round/>
+            <a:headEnd type="none" w="sm" len="sm"/>
+            <a:tailEnd type="none" w="sm" len="sm"/>
+          </a:ln>
+        </p:spPr>
+      </p:cxnSp>
+    </p:spTree>
+  </p:cSld>
+  <p:clrMapOvr>
+    <a:masterClrMapping/>
+  </p:clrMapOvr>
+</p:sld>
+</file>
+
 <file path=ppt/slides/slide2.xml><?xml version="1.0" encoding="utf-8"?>
 <p:sld xmlns:a="http://schemas.openxmlformats.org/drawingml/2006/main" xmlns:r="http://schemas.openxmlformats.org/officeDocument/2006/relationships" xmlns:p="http://schemas.openxmlformats.org/presentationml/2006/main">
   <p:cSld>
@@ -31992,185 +31654,6 @@
         <p14:creationId xmlns:p14="http://schemas.microsoft.com/office/powerpoint/2010/main" val="1216676150"/>
       </p:ext>
     </p:extLst>
-  </p:cSld>
-  <p:clrMapOvr>
-    <a:masterClrMapping/>
-  </p:clrMapOvr>
-</p:sld>
-</file>
-
-<file path=ppt/slides/slide20.xml><?xml version="1.0" encoding="utf-8"?>
-<p:sld xmlns:a="http://schemas.openxmlformats.org/drawingml/2006/main" xmlns:r="http://schemas.openxmlformats.org/officeDocument/2006/relationships" xmlns:p="http://schemas.openxmlformats.org/presentationml/2006/main">
-  <p:cSld>
-    <p:spTree>
-      <p:nvGrpSpPr>
-        <p:cNvPr id="1" name="Shape 342"/>
-        <p:cNvGrpSpPr/>
-        <p:nvPr/>
-      </p:nvGrpSpPr>
-      <p:grpSpPr>
-        <a:xfrm>
-          <a:off x="0" y="0"/>
-          <a:ext cx="0" cy="0"/>
-          <a:chOff x="0" y="0"/>
-          <a:chExt cx="0" cy="0"/>
-        </a:xfrm>
-      </p:grpSpPr>
-      <p:pic>
-        <p:nvPicPr>
-          <p:cNvPr id="343" name="Google Shape;343;p42" descr="14902-NQ2QMR.jpg"/>
-          <p:cNvPicPr preferRelativeResize="0"/>
-          <p:nvPr/>
-        </p:nvPicPr>
-        <p:blipFill rotWithShape="1">
-          <a:blip r:embed="rId3">
-            <a:alphaModFix/>
-            <a:duotone>
-              <a:prstClr val="black"/>
-              <a:schemeClr val="accent3">
-                <a:lumMod val="60000"/>
-                <a:lumOff val="40000"/>
-                <a:tint val="45000"/>
-                <a:satMod val="400000"/>
-              </a:schemeClr>
-            </a:duotone>
-          </a:blip>
-          <a:srcRect l="3150" t="52499" r="92970" b="43301"/>
-          <a:stretch/>
-        </p:blipFill>
-        <p:spPr>
-          <a:xfrm>
-            <a:off x="0" y="0"/>
-            <a:ext cx="9144000" cy="6858000"/>
-          </a:xfrm>
-          <a:prstGeom prst="rect">
-            <a:avLst/>
-          </a:prstGeom>
-          <a:noFill/>
-          <a:ln>
-            <a:noFill/>
-          </a:ln>
-        </p:spPr>
-      </p:pic>
-      <p:sp>
-        <p:nvSpPr>
-          <p:cNvPr id="344" name="Google Shape;344;p42"/>
-          <p:cNvSpPr txBox="1">
-            <a:spLocks noGrp="1"/>
-          </p:cNvSpPr>
-          <p:nvPr>
-            <p:ph type="subTitle" idx="1"/>
-          </p:nvPr>
-        </p:nvSpPr>
-        <p:spPr>
-          <a:xfrm>
-            <a:off x="2987824" y="3140968"/>
-            <a:ext cx="5832648" cy="1080120"/>
-          </a:xfrm>
-          <a:prstGeom prst="rect">
-            <a:avLst/>
-          </a:prstGeom>
-          <a:noFill/>
-          <a:ln>
-            <a:noFill/>
-          </a:ln>
-        </p:spPr>
-        <p:txBody>
-          <a:bodyPr spcFirstLastPara="1" wrap="square" lIns="91425" tIns="45700" rIns="91425" bIns="45700" anchor="t" anchorCtr="0">
-            <a:noAutofit/>
-          </a:bodyPr>
-          <a:lstStyle/>
-          <a:p>
-            <a:pPr marL="0" lvl="0" indent="0" algn="ctr" rtl="0">
-              <a:spcBef>
-                <a:spcPts val="880"/>
-              </a:spcBef>
-              <a:spcAft>
-                <a:spcPts val="0"/>
-              </a:spcAft>
-              <a:buClr>
-                <a:srgbClr val="888888"/>
-              </a:buClr>
-              <a:buSzPts val="4400"/>
-              <a:buNone/>
-            </a:pPr>
-            <a:r>
-              <a:rPr lang="en-US" sz="4400" b="1" dirty="0">
-                <a:solidFill>
-                  <a:schemeClr val="lt1"/>
-                </a:solidFill>
-                <a:latin typeface="Malgun Gothic"/>
-                <a:ea typeface="Malgun Gothic"/>
-                <a:cs typeface="Malgun Gothic"/>
-                <a:sym typeface="Malgun Gothic"/>
-              </a:rPr>
-              <a:t>Q&amp;A</a:t>
-            </a:r>
-            <a:endParaRPr sz="4400" b="1" dirty="0">
-              <a:solidFill>
-                <a:schemeClr val="lt1"/>
-              </a:solidFill>
-              <a:latin typeface="Malgun Gothic"/>
-              <a:ea typeface="Malgun Gothic"/>
-              <a:cs typeface="Malgun Gothic"/>
-              <a:sym typeface="Malgun Gothic"/>
-            </a:endParaRPr>
-          </a:p>
-        </p:txBody>
-      </p:sp>
-      <p:cxnSp>
-        <p:nvCxnSpPr>
-          <p:cNvPr id="345" name="Google Shape;345;p42"/>
-          <p:cNvCxnSpPr/>
-          <p:nvPr/>
-        </p:nvCxnSpPr>
-        <p:spPr>
-          <a:xfrm>
-            <a:off x="0" y="980728"/>
-            <a:ext cx="9144000" cy="0"/>
-          </a:xfrm>
-          <a:prstGeom prst="straightConnector1">
-            <a:avLst/>
-          </a:prstGeom>
-          <a:noFill/>
-          <a:ln w="38100" cap="flat" cmpd="sng">
-            <a:solidFill>
-              <a:srgbClr val="F8F9FA"/>
-            </a:solidFill>
-            <a:prstDash val="dash"/>
-            <a:round/>
-            <a:headEnd type="none" w="sm" len="sm"/>
-            <a:tailEnd type="none" w="sm" len="sm"/>
-          </a:ln>
-        </p:spPr>
-      </p:cxnSp>
-      <p:cxnSp>
-        <p:nvCxnSpPr>
-          <p:cNvPr id="346" name="Google Shape;346;p42"/>
-          <p:cNvCxnSpPr/>
-          <p:nvPr/>
-        </p:nvCxnSpPr>
-        <p:spPr>
-          <a:xfrm>
-            <a:off x="0" y="5877272"/>
-            <a:ext cx="9144000" cy="0"/>
-          </a:xfrm>
-          <a:prstGeom prst="straightConnector1">
-            <a:avLst/>
-          </a:prstGeom>
-          <a:noFill/>
-          <a:ln w="38100" cap="flat" cmpd="sng">
-            <a:solidFill>
-              <a:srgbClr val="F8F9FA"/>
-            </a:solidFill>
-            <a:prstDash val="dash"/>
-            <a:round/>
-            <a:headEnd type="none" w="sm" len="sm"/>
-            <a:tailEnd type="none" w="sm" len="sm"/>
-          </a:ln>
-        </p:spPr>
-      </p:cxnSp>
-    </p:spTree>
   </p:cSld>
   <p:clrMapOvr>
     <a:masterClrMapping/>

</xml_diff>